<commit_message>
Update AM modulation documentation
</commit_message>
<xml_diff>
--- a/electronics/AM_modulation_fiber/AM_modulation_doc.pptx
+++ b/electronics/AM_modulation_fiber/AM_modulation_doc.pptx
@@ -4373,7 +4373,7 @@
         </p:nvSpPr>
         <p:spPr>
           <a:xfrm>
-            <a:off x="3256782" y="1964330"/>
+            <a:off x="3229350" y="1982618"/>
             <a:ext cx="464058" cy="523220"/>
           </a:xfrm>
           <a:prstGeom prst="rect">
@@ -5139,8 +5139,8 @@
         </p:nvCxnSpPr>
         <p:spPr>
           <a:xfrm flipV="1">
-            <a:off x="8313682" y="3105070"/>
-            <a:ext cx="2283106" cy="6433"/>
+            <a:off x="8341858" y="1785153"/>
+            <a:ext cx="2180940" cy="4890"/>
           </a:xfrm>
           <a:prstGeom prst="straightConnector1">
             <a:avLst/>
@@ -5183,9 +5183,9 @@
           <p:nvPr/>
         </p:nvCxnSpPr>
         <p:spPr>
-          <a:xfrm>
-            <a:off x="8341858" y="2247202"/>
-            <a:ext cx="0" cy="857868"/>
+          <a:xfrm flipV="1">
+            <a:off x="8341858" y="1791586"/>
+            <a:ext cx="0" cy="455616"/>
           </a:xfrm>
           <a:prstGeom prst="straightConnector1">
             <a:avLst/>
@@ -5228,7 +5228,7 @@
         </p:nvSpPr>
         <p:spPr>
           <a:xfrm>
-            <a:off x="10596788" y="2975148"/>
+            <a:off x="10522798" y="1655231"/>
             <a:ext cx="922316" cy="259843"/>
           </a:xfrm>
           <a:prstGeom prst="roundRect">
@@ -5237,7 +5237,10 @@
             </a:avLst>
           </a:prstGeom>
           <a:solidFill>
-            <a:srgbClr val="00B0F0"/>
+            <a:schemeClr val="accent1">
+              <a:lumMod val="40000"/>
+              <a:lumOff val="60000"/>
+            </a:schemeClr>
           </a:solidFill>
           <a:ln>
             <a:solidFill>
@@ -5380,7 +5383,7 @@
         </p:nvSpPr>
         <p:spPr>
           <a:xfrm>
-            <a:off x="8536889" y="2499216"/>
+            <a:off x="8450890" y="2509646"/>
             <a:ext cx="1168639" cy="307777"/>
           </a:xfrm>
           <a:prstGeom prst="rect">
@@ -5635,7 +5638,7 @@
             </a:avLst>
           </a:prstGeom>
           <a:solidFill>
-            <a:srgbClr val="FFFF00"/>
+            <a:srgbClr val="92D050"/>
           </a:solidFill>
           <a:ln>
             <a:solidFill>
@@ -5711,6 +5714,1950 @@
           </a:prstGeom>
         </p:spPr>
       </p:pic>
+      <p:sp>
+        <p:nvSpPr>
+          <p:cNvPr id="8" name="Rectangle 7">
+            <a:extLst>
+              <a:ext uri="{FF2B5EF4-FFF2-40B4-BE49-F238E27FC236}">
+                <a16:creationId xmlns:a16="http://schemas.microsoft.com/office/drawing/2014/main" id="{2FF18CEF-E9BF-0575-C126-9AF5E06FC85E}"/>
+              </a:ext>
+            </a:extLst>
+          </p:cNvPr>
+          <p:cNvSpPr/>
+          <p:nvPr/>
+        </p:nvSpPr>
+        <p:spPr>
+          <a:xfrm>
+            <a:off x="2604426" y="3897510"/>
+            <a:ext cx="1547750" cy="2129074"/>
+          </a:xfrm>
+          <a:prstGeom prst="rect">
+            <a:avLst/>
+          </a:prstGeom>
+          <a:solidFill>
+            <a:schemeClr val="bg2"/>
+          </a:solidFill>
+        </p:spPr>
+        <p:style>
+          <a:lnRef idx="2">
+            <a:schemeClr val="accent1">
+              <a:shade val="15000"/>
+            </a:schemeClr>
+          </a:lnRef>
+          <a:fillRef idx="1">
+            <a:schemeClr val="accent1"/>
+          </a:fillRef>
+          <a:effectRef idx="0">
+            <a:schemeClr val="accent1"/>
+          </a:effectRef>
+          <a:fontRef idx="minor">
+            <a:schemeClr val="lt1"/>
+          </a:fontRef>
+        </p:style>
+        <p:txBody>
+          <a:bodyPr rtlCol="0" anchor="ctr"/>
+          <a:lstStyle/>
+          <a:p>
+            <a:pPr algn="ctr"/>
+            <a:endParaRPr lang="fr-FR"/>
+          </a:p>
+        </p:txBody>
+      </p:sp>
+      <p:sp>
+        <p:nvSpPr>
+          <p:cNvPr id="9" name="ZoneTexte 8">
+            <a:extLst>
+              <a:ext uri="{FF2B5EF4-FFF2-40B4-BE49-F238E27FC236}">
+                <a16:creationId xmlns:a16="http://schemas.microsoft.com/office/drawing/2014/main" id="{2FF8FC1E-4E4C-8E2C-64DB-78EF89CC8522}"/>
+              </a:ext>
+            </a:extLst>
+          </p:cNvPr>
+          <p:cNvSpPr txBox="1"/>
+          <p:nvPr/>
+        </p:nvSpPr>
+        <p:spPr>
+          <a:xfrm>
+            <a:off x="2612728" y="3960029"/>
+            <a:ext cx="2066541" cy="276999"/>
+          </a:xfrm>
+          <a:prstGeom prst="rect">
+            <a:avLst/>
+          </a:prstGeom>
+          <a:noFill/>
+        </p:spPr>
+        <p:txBody>
+          <a:bodyPr wrap="square" rtlCol="0">
+            <a:spAutoFit/>
+          </a:bodyPr>
+          <a:lstStyle/>
+          <a:p>
+            <a:r>
+              <a:rPr lang="fr-FR" sz="1200" b="1" dirty="0"/>
+              <a:t>Modulation</a:t>
+            </a:r>
+          </a:p>
+        </p:txBody>
+      </p:sp>
+      <p:sp>
+        <p:nvSpPr>
+          <p:cNvPr id="11" name="Ellipse 10">
+            <a:extLst>
+              <a:ext uri="{FF2B5EF4-FFF2-40B4-BE49-F238E27FC236}">
+                <a16:creationId xmlns:a16="http://schemas.microsoft.com/office/drawing/2014/main" id="{56948B06-1F58-52EC-711E-743E4EDC59DC}"/>
+              </a:ext>
+            </a:extLst>
+          </p:cNvPr>
+          <p:cNvSpPr/>
+          <p:nvPr/>
+        </p:nvSpPr>
+        <p:spPr>
+          <a:xfrm>
+            <a:off x="3052710" y="4411806"/>
+            <a:ext cx="720000" cy="720000"/>
+          </a:xfrm>
+          <a:prstGeom prst="ellipse">
+            <a:avLst/>
+          </a:prstGeom>
+        </p:spPr>
+        <p:style>
+          <a:lnRef idx="2">
+            <a:schemeClr val="accent1">
+              <a:shade val="15000"/>
+            </a:schemeClr>
+          </a:lnRef>
+          <a:fillRef idx="1">
+            <a:schemeClr val="accent1"/>
+          </a:fillRef>
+          <a:effectRef idx="0">
+            <a:schemeClr val="accent1"/>
+          </a:effectRef>
+          <a:fontRef idx="minor">
+            <a:schemeClr val="lt1"/>
+          </a:fontRef>
+        </p:style>
+        <p:txBody>
+          <a:bodyPr rtlCol="0" anchor="ctr"/>
+          <a:lstStyle/>
+          <a:p>
+            <a:pPr algn="ctr"/>
+            <a:endParaRPr lang="fr-FR">
+              <a:ln w="0"/>
+              <a:solidFill>
+                <a:schemeClr val="tx1"/>
+              </a:solidFill>
+              <a:effectLst>
+                <a:outerShdw blurRad="38100" dist="19050" dir="2700000" algn="tl" rotWithShape="0">
+                  <a:schemeClr val="dk1">
+                    <a:alpha val="40000"/>
+                  </a:schemeClr>
+                </a:outerShdw>
+              </a:effectLst>
+            </a:endParaRPr>
+          </a:p>
+        </p:txBody>
+      </p:sp>
+      <p:sp>
+        <p:nvSpPr>
+          <p:cNvPr id="12" name="ZoneTexte 11">
+            <a:extLst>
+              <a:ext uri="{FF2B5EF4-FFF2-40B4-BE49-F238E27FC236}">
+                <a16:creationId xmlns:a16="http://schemas.microsoft.com/office/drawing/2014/main" id="{A9347EE6-0C0B-0DE7-D2E1-F162F36B8F57}"/>
+              </a:ext>
+            </a:extLst>
+          </p:cNvPr>
+          <p:cNvSpPr txBox="1"/>
+          <p:nvPr/>
+        </p:nvSpPr>
+        <p:spPr>
+          <a:xfrm>
+            <a:off x="3229350" y="4515322"/>
+            <a:ext cx="464058" cy="523220"/>
+          </a:xfrm>
+          <a:prstGeom prst="rect">
+            <a:avLst/>
+          </a:prstGeom>
+          <a:noFill/>
+        </p:spPr>
+        <p:txBody>
+          <a:bodyPr wrap="square">
+            <a:spAutoFit/>
+          </a:bodyPr>
+          <a:lstStyle/>
+          <a:p>
+            <a:r>
+              <a:rPr lang="fr-FR" sz="2800" b="0" strike="noStrike" spc="-1" dirty="0">
+                <a:solidFill>
+                  <a:schemeClr val="bg1"/>
+                </a:solidFill>
+                <a:latin typeface="Calibri"/>
+                <a:ea typeface="DejaVu Sans"/>
+              </a:rPr>
+              <a:t>X</a:t>
+            </a:r>
+            <a:endParaRPr lang="fr-FR" sz="2800" dirty="0">
+              <a:solidFill>
+                <a:schemeClr val="bg1"/>
+              </a:solidFill>
+            </a:endParaRPr>
+          </a:p>
+        </p:txBody>
+      </p:sp>
+      <p:cxnSp>
+        <p:nvCxnSpPr>
+          <p:cNvPr id="13" name="Connecteur droit avec flèche 12">
+            <a:extLst>
+              <a:ext uri="{FF2B5EF4-FFF2-40B4-BE49-F238E27FC236}">
+                <a16:creationId xmlns:a16="http://schemas.microsoft.com/office/drawing/2014/main" id="{2EEDFF4C-F497-3CC9-460A-36379A614C2D}"/>
+              </a:ext>
+            </a:extLst>
+          </p:cNvPr>
+          <p:cNvCxnSpPr>
+            <a:cxnSpLocks/>
+            <a:stCxn id="20" idx="0"/>
+            <a:endCxn id="11" idx="4"/>
+          </p:cNvCxnSpPr>
+          <p:nvPr/>
+        </p:nvCxnSpPr>
+        <p:spPr>
+          <a:xfrm flipV="1">
+            <a:off x="3412710" y="5131806"/>
+            <a:ext cx="0" cy="187545"/>
+          </a:xfrm>
+          <a:prstGeom prst="straightConnector1">
+            <a:avLst/>
+          </a:prstGeom>
+          <a:ln w="38100">
+            <a:solidFill>
+              <a:schemeClr val="tx1"/>
+            </a:solidFill>
+            <a:tailEnd type="triangle"/>
+          </a:ln>
+        </p:spPr>
+        <p:style>
+          <a:lnRef idx="1">
+            <a:schemeClr val="accent1"/>
+          </a:lnRef>
+          <a:fillRef idx="0">
+            <a:schemeClr val="accent1"/>
+          </a:fillRef>
+          <a:effectRef idx="0">
+            <a:schemeClr val="accent1"/>
+          </a:effectRef>
+          <a:fontRef idx="minor">
+            <a:schemeClr val="tx1"/>
+          </a:fontRef>
+        </p:style>
+      </p:cxnSp>
+      <p:sp>
+        <p:nvSpPr>
+          <p:cNvPr id="20" name="CustomShape 25">
+            <a:extLst>
+              <a:ext uri="{FF2B5EF4-FFF2-40B4-BE49-F238E27FC236}">
+                <a16:creationId xmlns:a16="http://schemas.microsoft.com/office/drawing/2014/main" id="{E0FED9A8-2760-6632-1D48-6FB684F7E2E1}"/>
+              </a:ext>
+            </a:extLst>
+          </p:cNvPr>
+          <p:cNvSpPr/>
+          <p:nvPr/>
+        </p:nvSpPr>
+        <p:spPr>
+          <a:xfrm>
+            <a:off x="3052710" y="5319351"/>
+            <a:ext cx="719999" cy="259843"/>
+          </a:xfrm>
+          <a:prstGeom prst="roundRect">
+            <a:avLst>
+              <a:gd name="adj" fmla="val 16667"/>
+            </a:avLst>
+          </a:prstGeom>
+          <a:solidFill>
+            <a:schemeClr val="accent2">
+              <a:lumMod val="60000"/>
+              <a:lumOff val="40000"/>
+            </a:schemeClr>
+          </a:solidFill>
+          <a:ln>
+            <a:solidFill>
+              <a:schemeClr val="tx1"/>
+            </a:solidFill>
+          </a:ln>
+        </p:spPr>
+        <p:style>
+          <a:lnRef idx="2">
+            <a:schemeClr val="accent1">
+              <a:shade val="50000"/>
+            </a:schemeClr>
+          </a:lnRef>
+          <a:fillRef idx="1">
+            <a:schemeClr val="accent1"/>
+          </a:fillRef>
+          <a:effectRef idx="0">
+            <a:schemeClr val="accent1"/>
+          </a:effectRef>
+          <a:fontRef idx="minor"/>
+        </p:style>
+        <p:txBody>
+          <a:bodyPr lIns="90000" tIns="90000" rIns="90000" bIns="90000" anchor="ctr">
+            <a:noAutofit/>
+          </a:bodyPr>
+          <a:lstStyle/>
+          <a:p>
+            <a:pPr algn="ctr">
+              <a:lnSpc>
+                <a:spcPct val="100000"/>
+              </a:lnSpc>
+            </a:pPr>
+            <a:r>
+              <a:rPr lang="fr-FR" sz="1200" strike="noStrike" spc="-1" dirty="0">
+                <a:latin typeface="Calibri"/>
+                <a:ea typeface="DejaVu Sans"/>
+              </a:rPr>
+              <a:t>1/10V</a:t>
+            </a:r>
+            <a:endParaRPr lang="fr-FR" sz="1200" strike="noStrike" spc="-1" dirty="0">
+              <a:latin typeface="Arial"/>
+            </a:endParaRPr>
+          </a:p>
+        </p:txBody>
+      </p:sp>
+      <p:cxnSp>
+        <p:nvCxnSpPr>
+          <p:cNvPr id="23" name="Connecteur droit avec flèche 22">
+            <a:extLst>
+              <a:ext uri="{FF2B5EF4-FFF2-40B4-BE49-F238E27FC236}">
+                <a16:creationId xmlns:a16="http://schemas.microsoft.com/office/drawing/2014/main" id="{CA4B6DB9-A07D-788B-4C98-0CEC0BBA714F}"/>
+              </a:ext>
+            </a:extLst>
+          </p:cNvPr>
+          <p:cNvCxnSpPr>
+            <a:cxnSpLocks/>
+            <a:endCxn id="11" idx="1"/>
+          </p:cNvCxnSpPr>
+          <p:nvPr/>
+        </p:nvCxnSpPr>
+        <p:spPr>
+          <a:xfrm>
+            <a:off x="2842968" y="4411806"/>
+            <a:ext cx="315184" cy="105442"/>
+          </a:xfrm>
+          <a:prstGeom prst="straightConnector1">
+            <a:avLst/>
+          </a:prstGeom>
+          <a:ln w="38100">
+            <a:solidFill>
+              <a:schemeClr val="tx1"/>
+            </a:solidFill>
+            <a:tailEnd type="triangle"/>
+          </a:ln>
+        </p:spPr>
+        <p:style>
+          <a:lnRef idx="1">
+            <a:schemeClr val="accent1"/>
+          </a:lnRef>
+          <a:fillRef idx="0">
+            <a:schemeClr val="accent1"/>
+          </a:fillRef>
+          <a:effectRef idx="0">
+            <a:schemeClr val="accent1"/>
+          </a:effectRef>
+          <a:fontRef idx="minor">
+            <a:schemeClr val="tx1"/>
+          </a:fontRef>
+        </p:style>
+      </p:cxnSp>
+      <p:cxnSp>
+        <p:nvCxnSpPr>
+          <p:cNvPr id="26" name="Connecteur droit avec flèche 25">
+            <a:extLst>
+              <a:ext uri="{FF2B5EF4-FFF2-40B4-BE49-F238E27FC236}">
+                <a16:creationId xmlns:a16="http://schemas.microsoft.com/office/drawing/2014/main" id="{D7FEBA46-0A87-5870-1ABA-0DD307250D45}"/>
+              </a:ext>
+            </a:extLst>
+          </p:cNvPr>
+          <p:cNvCxnSpPr>
+            <a:cxnSpLocks/>
+            <a:endCxn id="11" idx="3"/>
+          </p:cNvCxnSpPr>
+          <p:nvPr/>
+        </p:nvCxnSpPr>
+        <p:spPr>
+          <a:xfrm flipV="1">
+            <a:off x="2842968" y="5026364"/>
+            <a:ext cx="315184" cy="117680"/>
+          </a:xfrm>
+          <a:prstGeom prst="straightConnector1">
+            <a:avLst/>
+          </a:prstGeom>
+          <a:ln w="38100">
+            <a:solidFill>
+              <a:schemeClr val="tx1"/>
+            </a:solidFill>
+            <a:tailEnd type="triangle"/>
+          </a:ln>
+        </p:spPr>
+        <p:style>
+          <a:lnRef idx="1">
+            <a:schemeClr val="accent1"/>
+          </a:lnRef>
+          <a:fillRef idx="0">
+            <a:schemeClr val="accent1"/>
+          </a:fillRef>
+          <a:effectRef idx="0">
+            <a:schemeClr val="accent1"/>
+          </a:effectRef>
+          <a:fontRef idx="minor">
+            <a:schemeClr val="tx1"/>
+          </a:fontRef>
+        </p:style>
+      </p:cxnSp>
+      <p:cxnSp>
+        <p:nvCxnSpPr>
+          <p:cNvPr id="30" name="Connecteur droit avec flèche 29">
+            <a:extLst>
+              <a:ext uri="{FF2B5EF4-FFF2-40B4-BE49-F238E27FC236}">
+                <a16:creationId xmlns:a16="http://schemas.microsoft.com/office/drawing/2014/main" id="{5FE2DF3E-AF3F-1B7B-ECB8-AE2CEFA087CC}"/>
+              </a:ext>
+            </a:extLst>
+          </p:cNvPr>
+          <p:cNvCxnSpPr>
+            <a:cxnSpLocks/>
+            <a:stCxn id="34" idx="3"/>
+          </p:cNvCxnSpPr>
+          <p:nvPr/>
+        </p:nvCxnSpPr>
+        <p:spPr>
+          <a:xfrm>
+            <a:off x="2438826" y="4403097"/>
+            <a:ext cx="404142" cy="0"/>
+          </a:xfrm>
+          <a:prstGeom prst="straightConnector1">
+            <a:avLst/>
+          </a:prstGeom>
+          <a:ln w="38100">
+            <a:solidFill>
+              <a:schemeClr val="tx1"/>
+            </a:solidFill>
+            <a:headEnd type="none" w="med" len="med"/>
+            <a:tailEnd type="none" w="med" len="med"/>
+          </a:ln>
+        </p:spPr>
+        <p:style>
+          <a:lnRef idx="1">
+            <a:schemeClr val="accent1"/>
+          </a:lnRef>
+          <a:fillRef idx="0">
+            <a:schemeClr val="accent1"/>
+          </a:fillRef>
+          <a:effectRef idx="0">
+            <a:schemeClr val="accent1"/>
+          </a:effectRef>
+          <a:fontRef idx="minor">
+            <a:schemeClr val="tx1"/>
+          </a:fontRef>
+        </p:style>
+      </p:cxnSp>
+      <p:cxnSp>
+        <p:nvCxnSpPr>
+          <p:cNvPr id="32" name="Connecteur droit avec flèche 31">
+            <a:extLst>
+              <a:ext uri="{FF2B5EF4-FFF2-40B4-BE49-F238E27FC236}">
+                <a16:creationId xmlns:a16="http://schemas.microsoft.com/office/drawing/2014/main" id="{CD76978B-F75A-2A9D-0977-B7E338D254E2}"/>
+              </a:ext>
+            </a:extLst>
+          </p:cNvPr>
+          <p:cNvCxnSpPr>
+            <a:cxnSpLocks/>
+            <a:stCxn id="35" idx="3"/>
+          </p:cNvCxnSpPr>
+          <p:nvPr/>
+        </p:nvCxnSpPr>
+        <p:spPr>
+          <a:xfrm>
+            <a:off x="2438826" y="5144044"/>
+            <a:ext cx="404142" cy="0"/>
+          </a:xfrm>
+          <a:prstGeom prst="straightConnector1">
+            <a:avLst/>
+          </a:prstGeom>
+          <a:ln w="38100">
+            <a:solidFill>
+              <a:schemeClr val="tx1"/>
+            </a:solidFill>
+            <a:headEnd type="none" w="med" len="med"/>
+            <a:tailEnd type="none" w="med" len="med"/>
+          </a:ln>
+        </p:spPr>
+        <p:style>
+          <a:lnRef idx="1">
+            <a:schemeClr val="accent1"/>
+          </a:lnRef>
+          <a:fillRef idx="0">
+            <a:schemeClr val="accent1"/>
+          </a:fillRef>
+          <a:effectRef idx="0">
+            <a:schemeClr val="accent1"/>
+          </a:effectRef>
+          <a:fontRef idx="minor">
+            <a:schemeClr val="tx1"/>
+          </a:fontRef>
+        </p:style>
+      </p:cxnSp>
+      <p:sp>
+        <p:nvSpPr>
+          <p:cNvPr id="34" name="CustomShape 25">
+            <a:extLst>
+              <a:ext uri="{FF2B5EF4-FFF2-40B4-BE49-F238E27FC236}">
+                <a16:creationId xmlns:a16="http://schemas.microsoft.com/office/drawing/2014/main" id="{523ECD57-387A-2B87-8CC0-0AB7517E7A23}"/>
+              </a:ext>
+            </a:extLst>
+          </p:cNvPr>
+          <p:cNvSpPr/>
+          <p:nvPr/>
+        </p:nvSpPr>
+        <p:spPr>
+          <a:xfrm>
+            <a:off x="1765505" y="4250862"/>
+            <a:ext cx="673321" cy="304470"/>
+          </a:xfrm>
+          <a:prstGeom prst="roundRect">
+            <a:avLst>
+              <a:gd name="adj" fmla="val 16667"/>
+            </a:avLst>
+          </a:prstGeom>
+          <a:solidFill>
+            <a:schemeClr val="accent4"/>
+          </a:solidFill>
+          <a:ln>
+            <a:solidFill>
+              <a:schemeClr val="tx1"/>
+            </a:solidFill>
+          </a:ln>
+        </p:spPr>
+        <p:style>
+          <a:lnRef idx="2">
+            <a:schemeClr val="accent1">
+              <a:shade val="50000"/>
+            </a:schemeClr>
+          </a:lnRef>
+          <a:fillRef idx="1">
+            <a:schemeClr val="accent1"/>
+          </a:fillRef>
+          <a:effectRef idx="0">
+            <a:schemeClr val="accent1"/>
+          </a:effectRef>
+          <a:fontRef idx="minor"/>
+        </p:style>
+        <p:txBody>
+          <a:bodyPr lIns="90000" tIns="90000" rIns="90000" bIns="90000" anchor="ctr">
+            <a:noAutofit/>
+          </a:bodyPr>
+          <a:lstStyle/>
+          <a:p>
+            <a:pPr algn="ctr">
+              <a:lnSpc>
+                <a:spcPct val="100000"/>
+              </a:lnSpc>
+            </a:pPr>
+            <a:r>
+              <a:rPr lang="fr-FR" sz="1400" b="1" strike="noStrike" spc="-1" dirty="0">
+                <a:latin typeface="Calibri"/>
+                <a:ea typeface="DejaVu Sans"/>
+              </a:rPr>
+              <a:t>CAR</a:t>
+            </a:r>
+            <a:endParaRPr lang="fr-FR" sz="1400" b="1" strike="noStrike" spc="-1" dirty="0">
+              <a:latin typeface="Arial"/>
+            </a:endParaRPr>
+          </a:p>
+        </p:txBody>
+      </p:sp>
+      <p:sp>
+        <p:nvSpPr>
+          <p:cNvPr id="35" name="CustomShape 25">
+            <a:extLst>
+              <a:ext uri="{FF2B5EF4-FFF2-40B4-BE49-F238E27FC236}">
+                <a16:creationId xmlns:a16="http://schemas.microsoft.com/office/drawing/2014/main" id="{0E99A28A-EC2D-31CD-7EBA-102377BE8E79}"/>
+              </a:ext>
+            </a:extLst>
+          </p:cNvPr>
+          <p:cNvSpPr/>
+          <p:nvPr/>
+        </p:nvSpPr>
+        <p:spPr>
+          <a:xfrm>
+            <a:off x="1765505" y="4991809"/>
+            <a:ext cx="673321" cy="304470"/>
+          </a:xfrm>
+          <a:prstGeom prst="roundRect">
+            <a:avLst>
+              <a:gd name="adj" fmla="val 16667"/>
+            </a:avLst>
+          </a:prstGeom>
+          <a:solidFill>
+            <a:srgbClr val="00B0F0"/>
+          </a:solidFill>
+          <a:ln>
+            <a:solidFill>
+              <a:schemeClr val="tx1"/>
+            </a:solidFill>
+          </a:ln>
+        </p:spPr>
+        <p:style>
+          <a:lnRef idx="2">
+            <a:schemeClr val="accent1">
+              <a:shade val="50000"/>
+            </a:schemeClr>
+          </a:lnRef>
+          <a:fillRef idx="1">
+            <a:schemeClr val="accent1"/>
+          </a:fillRef>
+          <a:effectRef idx="0">
+            <a:schemeClr val="accent1"/>
+          </a:effectRef>
+          <a:fontRef idx="minor"/>
+        </p:style>
+        <p:txBody>
+          <a:bodyPr lIns="90000" tIns="90000" rIns="90000" bIns="90000" anchor="ctr">
+            <a:noAutofit/>
+          </a:bodyPr>
+          <a:lstStyle/>
+          <a:p>
+            <a:pPr algn="ctr">
+              <a:lnSpc>
+                <a:spcPct val="100000"/>
+              </a:lnSpc>
+            </a:pPr>
+            <a:r>
+              <a:rPr lang="fr-FR" sz="1400" b="1" strike="noStrike" spc="-1" dirty="0">
+                <a:latin typeface="Calibri"/>
+                <a:ea typeface="DejaVu Sans"/>
+              </a:rPr>
+              <a:t>MOD</a:t>
+            </a:r>
+            <a:endParaRPr lang="fr-FR" sz="1400" b="1" strike="noStrike" spc="-1" dirty="0">
+              <a:latin typeface="Arial"/>
+            </a:endParaRPr>
+          </a:p>
+        </p:txBody>
+      </p:sp>
+      <p:cxnSp>
+        <p:nvCxnSpPr>
+          <p:cNvPr id="43" name="Connecteur droit avec flèche 42">
+            <a:extLst>
+              <a:ext uri="{FF2B5EF4-FFF2-40B4-BE49-F238E27FC236}">
+                <a16:creationId xmlns:a16="http://schemas.microsoft.com/office/drawing/2014/main" id="{98660552-C62E-4BA0-2FF5-4821B1F58778}"/>
+              </a:ext>
+            </a:extLst>
+          </p:cNvPr>
+          <p:cNvCxnSpPr>
+            <a:cxnSpLocks/>
+            <a:stCxn id="11" idx="6"/>
+            <a:endCxn id="72" idx="1"/>
+          </p:cNvCxnSpPr>
+          <p:nvPr/>
+        </p:nvCxnSpPr>
+        <p:spPr>
+          <a:xfrm>
+            <a:off x="3772710" y="4771806"/>
+            <a:ext cx="694650" cy="0"/>
+          </a:xfrm>
+          <a:prstGeom prst="straightConnector1">
+            <a:avLst/>
+          </a:prstGeom>
+          <a:ln w="38100">
+            <a:solidFill>
+              <a:schemeClr val="tx1"/>
+            </a:solidFill>
+            <a:tailEnd type="triangle"/>
+          </a:ln>
+        </p:spPr>
+        <p:style>
+          <a:lnRef idx="1">
+            <a:schemeClr val="accent1"/>
+          </a:lnRef>
+          <a:fillRef idx="0">
+            <a:schemeClr val="accent1"/>
+          </a:fillRef>
+          <a:effectRef idx="0">
+            <a:schemeClr val="accent1"/>
+          </a:effectRef>
+          <a:fontRef idx="minor">
+            <a:schemeClr val="tx1"/>
+          </a:fontRef>
+        </p:style>
+      </p:cxnSp>
+      <p:sp>
+        <p:nvSpPr>
+          <p:cNvPr id="49" name="Rectangle 48">
+            <a:extLst>
+              <a:ext uri="{FF2B5EF4-FFF2-40B4-BE49-F238E27FC236}">
+                <a16:creationId xmlns:a16="http://schemas.microsoft.com/office/drawing/2014/main" id="{23623A94-C55B-4B4D-BB4D-17E4F67A000D}"/>
+              </a:ext>
+            </a:extLst>
+          </p:cNvPr>
+          <p:cNvSpPr/>
+          <p:nvPr/>
+        </p:nvSpPr>
+        <p:spPr>
+          <a:xfrm>
+            <a:off x="7218137" y="3897510"/>
+            <a:ext cx="2445210" cy="2129074"/>
+          </a:xfrm>
+          <a:prstGeom prst="rect">
+            <a:avLst/>
+          </a:prstGeom>
+          <a:solidFill>
+            <a:schemeClr val="bg2"/>
+          </a:solidFill>
+        </p:spPr>
+        <p:style>
+          <a:lnRef idx="2">
+            <a:schemeClr val="accent1">
+              <a:shade val="15000"/>
+            </a:schemeClr>
+          </a:lnRef>
+          <a:fillRef idx="1">
+            <a:schemeClr val="accent1"/>
+          </a:fillRef>
+          <a:effectRef idx="0">
+            <a:schemeClr val="accent1"/>
+          </a:effectRef>
+          <a:fontRef idx="minor">
+            <a:schemeClr val="lt1"/>
+          </a:fontRef>
+        </p:style>
+        <p:txBody>
+          <a:bodyPr rtlCol="0" anchor="ctr"/>
+          <a:lstStyle/>
+          <a:p>
+            <a:pPr algn="ctr"/>
+            <a:endParaRPr lang="fr-FR"/>
+          </a:p>
+        </p:txBody>
+      </p:sp>
+      <p:sp>
+        <p:nvSpPr>
+          <p:cNvPr id="50" name="ZoneTexte 49">
+            <a:extLst>
+              <a:ext uri="{FF2B5EF4-FFF2-40B4-BE49-F238E27FC236}">
+                <a16:creationId xmlns:a16="http://schemas.microsoft.com/office/drawing/2014/main" id="{A9A3614C-8AC7-7B46-6C48-2B28FED52EB4}"/>
+              </a:ext>
+            </a:extLst>
+          </p:cNvPr>
+          <p:cNvSpPr txBox="1"/>
+          <p:nvPr/>
+        </p:nvSpPr>
+        <p:spPr>
+          <a:xfrm>
+            <a:off x="7226439" y="3960029"/>
+            <a:ext cx="2066541" cy="276999"/>
+          </a:xfrm>
+          <a:prstGeom prst="rect">
+            <a:avLst/>
+          </a:prstGeom>
+          <a:noFill/>
+        </p:spPr>
+        <p:txBody>
+          <a:bodyPr wrap="square" rtlCol="0">
+            <a:spAutoFit/>
+          </a:bodyPr>
+          <a:lstStyle/>
+          <a:p>
+            <a:r>
+              <a:rPr lang="fr-FR" sz="1200" b="1" dirty="0"/>
+              <a:t>Démodulation</a:t>
+            </a:r>
+          </a:p>
+        </p:txBody>
+      </p:sp>
+      <p:sp>
+        <p:nvSpPr>
+          <p:cNvPr id="53" name="Ellipse 52">
+            <a:extLst>
+              <a:ext uri="{FF2B5EF4-FFF2-40B4-BE49-F238E27FC236}">
+                <a16:creationId xmlns:a16="http://schemas.microsoft.com/office/drawing/2014/main" id="{5670C3B3-8FDB-E2C2-B184-E778FFEF6E87}"/>
+              </a:ext>
+            </a:extLst>
+          </p:cNvPr>
+          <p:cNvSpPr/>
+          <p:nvPr/>
+        </p:nvSpPr>
+        <p:spPr>
+          <a:xfrm>
+            <a:off x="8626541" y="4411806"/>
+            <a:ext cx="720000" cy="720000"/>
+          </a:xfrm>
+          <a:prstGeom prst="ellipse">
+            <a:avLst/>
+          </a:prstGeom>
+        </p:spPr>
+        <p:style>
+          <a:lnRef idx="2">
+            <a:schemeClr val="accent1">
+              <a:shade val="15000"/>
+            </a:schemeClr>
+          </a:lnRef>
+          <a:fillRef idx="1">
+            <a:schemeClr val="accent1"/>
+          </a:fillRef>
+          <a:effectRef idx="0">
+            <a:schemeClr val="accent1"/>
+          </a:effectRef>
+          <a:fontRef idx="minor">
+            <a:schemeClr val="lt1"/>
+          </a:fontRef>
+        </p:style>
+        <p:txBody>
+          <a:bodyPr rtlCol="0" anchor="ctr"/>
+          <a:lstStyle/>
+          <a:p>
+            <a:pPr algn="ctr"/>
+            <a:endParaRPr lang="fr-FR">
+              <a:ln w="0"/>
+              <a:solidFill>
+                <a:schemeClr val="tx1"/>
+              </a:solidFill>
+              <a:effectLst>
+                <a:outerShdw blurRad="38100" dist="19050" dir="2700000" algn="tl" rotWithShape="0">
+                  <a:schemeClr val="dk1">
+                    <a:alpha val="40000"/>
+                  </a:schemeClr>
+                </a:outerShdw>
+              </a:effectLst>
+            </a:endParaRPr>
+          </a:p>
+        </p:txBody>
+      </p:sp>
+      <p:sp>
+        <p:nvSpPr>
+          <p:cNvPr id="54" name="ZoneTexte 53">
+            <a:extLst>
+              <a:ext uri="{FF2B5EF4-FFF2-40B4-BE49-F238E27FC236}">
+                <a16:creationId xmlns:a16="http://schemas.microsoft.com/office/drawing/2014/main" id="{557DB796-0E41-3B45-EA8B-372B6F480C87}"/>
+              </a:ext>
+            </a:extLst>
+          </p:cNvPr>
+          <p:cNvSpPr txBox="1"/>
+          <p:nvPr/>
+        </p:nvSpPr>
+        <p:spPr>
+          <a:xfrm>
+            <a:off x="8803181" y="4515322"/>
+            <a:ext cx="464058" cy="523220"/>
+          </a:xfrm>
+          <a:prstGeom prst="rect">
+            <a:avLst/>
+          </a:prstGeom>
+          <a:noFill/>
+        </p:spPr>
+        <p:txBody>
+          <a:bodyPr wrap="square">
+            <a:spAutoFit/>
+          </a:bodyPr>
+          <a:lstStyle/>
+          <a:p>
+            <a:r>
+              <a:rPr lang="fr-FR" sz="2800" b="0" strike="noStrike" spc="-1" dirty="0">
+                <a:solidFill>
+                  <a:schemeClr val="bg1"/>
+                </a:solidFill>
+                <a:latin typeface="Calibri"/>
+                <a:ea typeface="DejaVu Sans"/>
+              </a:rPr>
+              <a:t>X</a:t>
+            </a:r>
+            <a:endParaRPr lang="fr-FR" sz="2800" dirty="0">
+              <a:solidFill>
+                <a:schemeClr val="bg1"/>
+              </a:solidFill>
+            </a:endParaRPr>
+          </a:p>
+        </p:txBody>
+      </p:sp>
+      <p:cxnSp>
+        <p:nvCxnSpPr>
+          <p:cNvPr id="55" name="Connecteur droit avec flèche 54">
+            <a:extLst>
+              <a:ext uri="{FF2B5EF4-FFF2-40B4-BE49-F238E27FC236}">
+                <a16:creationId xmlns:a16="http://schemas.microsoft.com/office/drawing/2014/main" id="{C8EA003B-8950-958A-853E-30CE9BFAF4ED}"/>
+              </a:ext>
+            </a:extLst>
+          </p:cNvPr>
+          <p:cNvCxnSpPr>
+            <a:cxnSpLocks/>
+            <a:stCxn id="56" idx="0"/>
+            <a:endCxn id="53" idx="4"/>
+          </p:cNvCxnSpPr>
+          <p:nvPr/>
+        </p:nvCxnSpPr>
+        <p:spPr>
+          <a:xfrm flipV="1">
+            <a:off x="8986541" y="5131806"/>
+            <a:ext cx="0" cy="187545"/>
+          </a:xfrm>
+          <a:prstGeom prst="straightConnector1">
+            <a:avLst/>
+          </a:prstGeom>
+          <a:ln w="38100">
+            <a:solidFill>
+              <a:schemeClr val="tx1"/>
+            </a:solidFill>
+            <a:tailEnd type="triangle"/>
+          </a:ln>
+        </p:spPr>
+        <p:style>
+          <a:lnRef idx="1">
+            <a:schemeClr val="accent1"/>
+          </a:lnRef>
+          <a:fillRef idx="0">
+            <a:schemeClr val="accent1"/>
+          </a:fillRef>
+          <a:effectRef idx="0">
+            <a:schemeClr val="accent1"/>
+          </a:effectRef>
+          <a:fontRef idx="minor">
+            <a:schemeClr val="tx1"/>
+          </a:fontRef>
+        </p:style>
+      </p:cxnSp>
+      <p:sp>
+        <p:nvSpPr>
+          <p:cNvPr id="56" name="CustomShape 25">
+            <a:extLst>
+              <a:ext uri="{FF2B5EF4-FFF2-40B4-BE49-F238E27FC236}">
+                <a16:creationId xmlns:a16="http://schemas.microsoft.com/office/drawing/2014/main" id="{09D47580-A72F-21DC-1A96-AC4BC42A904A}"/>
+              </a:ext>
+            </a:extLst>
+          </p:cNvPr>
+          <p:cNvSpPr/>
+          <p:nvPr/>
+        </p:nvSpPr>
+        <p:spPr>
+          <a:xfrm>
+            <a:off x="8626541" y="5319351"/>
+            <a:ext cx="719999" cy="259843"/>
+          </a:xfrm>
+          <a:prstGeom prst="roundRect">
+            <a:avLst>
+              <a:gd name="adj" fmla="val 16667"/>
+            </a:avLst>
+          </a:prstGeom>
+          <a:solidFill>
+            <a:schemeClr val="accent2">
+              <a:lumMod val="60000"/>
+              <a:lumOff val="40000"/>
+            </a:schemeClr>
+          </a:solidFill>
+          <a:ln>
+            <a:solidFill>
+              <a:schemeClr val="tx1"/>
+            </a:solidFill>
+          </a:ln>
+        </p:spPr>
+        <p:style>
+          <a:lnRef idx="2">
+            <a:schemeClr val="accent1">
+              <a:shade val="50000"/>
+            </a:schemeClr>
+          </a:lnRef>
+          <a:fillRef idx="1">
+            <a:schemeClr val="accent1"/>
+          </a:fillRef>
+          <a:effectRef idx="0">
+            <a:schemeClr val="accent1"/>
+          </a:effectRef>
+          <a:fontRef idx="minor"/>
+        </p:style>
+        <p:txBody>
+          <a:bodyPr lIns="90000" tIns="90000" rIns="90000" bIns="90000" anchor="ctr">
+            <a:noAutofit/>
+          </a:bodyPr>
+          <a:lstStyle/>
+          <a:p>
+            <a:pPr algn="ctr">
+              <a:lnSpc>
+                <a:spcPct val="100000"/>
+              </a:lnSpc>
+            </a:pPr>
+            <a:r>
+              <a:rPr lang="fr-FR" sz="1200" strike="noStrike" spc="-1" dirty="0">
+                <a:latin typeface="Calibri"/>
+                <a:ea typeface="DejaVu Sans"/>
+              </a:rPr>
+              <a:t>1/10V</a:t>
+            </a:r>
+            <a:endParaRPr lang="fr-FR" sz="1200" strike="noStrike" spc="-1" dirty="0">
+              <a:latin typeface="Arial"/>
+            </a:endParaRPr>
+          </a:p>
+        </p:txBody>
+      </p:sp>
+      <p:cxnSp>
+        <p:nvCxnSpPr>
+          <p:cNvPr id="58" name="Connecteur droit avec flèche 57">
+            <a:extLst>
+              <a:ext uri="{FF2B5EF4-FFF2-40B4-BE49-F238E27FC236}">
+                <a16:creationId xmlns:a16="http://schemas.microsoft.com/office/drawing/2014/main" id="{2DAE38DF-AB7B-3473-41B6-1A145EFFB7B3}"/>
+              </a:ext>
+            </a:extLst>
+          </p:cNvPr>
+          <p:cNvCxnSpPr>
+            <a:cxnSpLocks/>
+            <a:endCxn id="53" idx="1"/>
+          </p:cNvCxnSpPr>
+          <p:nvPr/>
+        </p:nvCxnSpPr>
+        <p:spPr>
+          <a:xfrm>
+            <a:off x="8416799" y="4411806"/>
+            <a:ext cx="315184" cy="105442"/>
+          </a:xfrm>
+          <a:prstGeom prst="straightConnector1">
+            <a:avLst/>
+          </a:prstGeom>
+          <a:ln w="38100">
+            <a:solidFill>
+              <a:schemeClr val="tx1"/>
+            </a:solidFill>
+            <a:tailEnd type="triangle"/>
+          </a:ln>
+        </p:spPr>
+        <p:style>
+          <a:lnRef idx="1">
+            <a:schemeClr val="accent1"/>
+          </a:lnRef>
+          <a:fillRef idx="0">
+            <a:schemeClr val="accent1"/>
+          </a:fillRef>
+          <a:effectRef idx="0">
+            <a:schemeClr val="accent1"/>
+          </a:effectRef>
+          <a:fontRef idx="minor">
+            <a:schemeClr val="tx1"/>
+          </a:fontRef>
+        </p:style>
+      </p:cxnSp>
+      <p:cxnSp>
+        <p:nvCxnSpPr>
+          <p:cNvPr id="59" name="Connecteur droit avec flèche 58">
+            <a:extLst>
+              <a:ext uri="{FF2B5EF4-FFF2-40B4-BE49-F238E27FC236}">
+                <a16:creationId xmlns:a16="http://schemas.microsoft.com/office/drawing/2014/main" id="{1E99FA03-01DD-3E70-251B-5055CBDFFFD7}"/>
+              </a:ext>
+            </a:extLst>
+          </p:cNvPr>
+          <p:cNvCxnSpPr>
+            <a:cxnSpLocks/>
+            <a:endCxn id="53" idx="3"/>
+          </p:cNvCxnSpPr>
+          <p:nvPr/>
+        </p:nvCxnSpPr>
+        <p:spPr>
+          <a:xfrm flipV="1">
+            <a:off x="8416799" y="5026364"/>
+            <a:ext cx="315184" cy="117680"/>
+          </a:xfrm>
+          <a:prstGeom prst="straightConnector1">
+            <a:avLst/>
+          </a:prstGeom>
+          <a:ln w="38100">
+            <a:solidFill>
+              <a:schemeClr val="tx1"/>
+            </a:solidFill>
+            <a:tailEnd type="triangle"/>
+          </a:ln>
+        </p:spPr>
+        <p:style>
+          <a:lnRef idx="1">
+            <a:schemeClr val="accent1"/>
+          </a:lnRef>
+          <a:fillRef idx="0">
+            <a:schemeClr val="accent1"/>
+          </a:fillRef>
+          <a:effectRef idx="0">
+            <a:schemeClr val="accent1"/>
+          </a:effectRef>
+          <a:fontRef idx="minor">
+            <a:schemeClr val="tx1"/>
+          </a:fontRef>
+        </p:style>
+      </p:cxnSp>
+      <p:cxnSp>
+        <p:nvCxnSpPr>
+          <p:cNvPr id="64" name="Connecteur droit avec flèche 63">
+            <a:extLst>
+              <a:ext uri="{FF2B5EF4-FFF2-40B4-BE49-F238E27FC236}">
+                <a16:creationId xmlns:a16="http://schemas.microsoft.com/office/drawing/2014/main" id="{F2000467-C780-50FC-9C83-2A6EBD2C40B2}"/>
+              </a:ext>
+            </a:extLst>
+          </p:cNvPr>
+          <p:cNvCxnSpPr>
+            <a:cxnSpLocks/>
+            <a:stCxn id="66" idx="3"/>
+          </p:cNvCxnSpPr>
+          <p:nvPr/>
+        </p:nvCxnSpPr>
+        <p:spPr>
+          <a:xfrm>
+            <a:off x="8049233" y="4403097"/>
+            <a:ext cx="367566" cy="0"/>
+          </a:xfrm>
+          <a:prstGeom prst="straightConnector1">
+            <a:avLst/>
+          </a:prstGeom>
+          <a:ln w="38100">
+            <a:solidFill>
+              <a:schemeClr val="tx1"/>
+            </a:solidFill>
+            <a:headEnd type="none" w="med" len="med"/>
+            <a:tailEnd type="none" w="med" len="med"/>
+          </a:ln>
+        </p:spPr>
+        <p:style>
+          <a:lnRef idx="1">
+            <a:schemeClr val="accent1"/>
+          </a:lnRef>
+          <a:fillRef idx="0">
+            <a:schemeClr val="accent1"/>
+          </a:fillRef>
+          <a:effectRef idx="0">
+            <a:schemeClr val="accent1"/>
+          </a:effectRef>
+          <a:fontRef idx="minor">
+            <a:schemeClr val="tx1"/>
+          </a:fontRef>
+        </p:style>
+      </p:cxnSp>
+      <p:cxnSp>
+        <p:nvCxnSpPr>
+          <p:cNvPr id="65" name="Connecteur droit avec flèche 64">
+            <a:extLst>
+              <a:ext uri="{FF2B5EF4-FFF2-40B4-BE49-F238E27FC236}">
+                <a16:creationId xmlns:a16="http://schemas.microsoft.com/office/drawing/2014/main" id="{9B1A0B14-EEAF-265E-3DC8-7BEDF12D25D2}"/>
+              </a:ext>
+            </a:extLst>
+          </p:cNvPr>
+          <p:cNvCxnSpPr>
+            <a:cxnSpLocks/>
+            <a:stCxn id="67" idx="3"/>
+            <a:endCxn id="85" idx="3"/>
+          </p:cNvCxnSpPr>
+          <p:nvPr/>
+        </p:nvCxnSpPr>
+        <p:spPr>
+          <a:xfrm>
+            <a:off x="7336001" y="5144044"/>
+            <a:ext cx="369372" cy="1"/>
+          </a:xfrm>
+          <a:prstGeom prst="straightConnector1">
+            <a:avLst/>
+          </a:prstGeom>
+          <a:ln w="38100">
+            <a:solidFill>
+              <a:schemeClr val="tx1"/>
+            </a:solidFill>
+            <a:headEnd type="none" w="med" len="med"/>
+            <a:tailEnd type="none" w="med" len="med"/>
+          </a:ln>
+        </p:spPr>
+        <p:style>
+          <a:lnRef idx="1">
+            <a:schemeClr val="accent1"/>
+          </a:lnRef>
+          <a:fillRef idx="0">
+            <a:schemeClr val="accent1"/>
+          </a:fillRef>
+          <a:effectRef idx="0">
+            <a:schemeClr val="accent1"/>
+          </a:effectRef>
+          <a:fontRef idx="minor">
+            <a:schemeClr val="tx1"/>
+          </a:fontRef>
+        </p:style>
+      </p:cxnSp>
+      <p:sp>
+        <p:nvSpPr>
+          <p:cNvPr id="66" name="CustomShape 25">
+            <a:extLst>
+              <a:ext uri="{FF2B5EF4-FFF2-40B4-BE49-F238E27FC236}">
+                <a16:creationId xmlns:a16="http://schemas.microsoft.com/office/drawing/2014/main" id="{A4FE8CEA-D85D-AC50-6BA4-F55D8200D2F0}"/>
+              </a:ext>
+            </a:extLst>
+          </p:cNvPr>
+          <p:cNvSpPr/>
+          <p:nvPr/>
+        </p:nvSpPr>
+        <p:spPr>
+          <a:xfrm>
+            <a:off x="7375912" y="4250862"/>
+            <a:ext cx="673321" cy="304470"/>
+          </a:xfrm>
+          <a:prstGeom prst="roundRect">
+            <a:avLst>
+              <a:gd name="adj" fmla="val 16667"/>
+            </a:avLst>
+          </a:prstGeom>
+          <a:solidFill>
+            <a:schemeClr val="accent4"/>
+          </a:solidFill>
+          <a:ln>
+            <a:solidFill>
+              <a:schemeClr val="tx1"/>
+            </a:solidFill>
+          </a:ln>
+        </p:spPr>
+        <p:style>
+          <a:lnRef idx="2">
+            <a:schemeClr val="accent1">
+              <a:shade val="50000"/>
+            </a:schemeClr>
+          </a:lnRef>
+          <a:fillRef idx="1">
+            <a:schemeClr val="accent1"/>
+          </a:fillRef>
+          <a:effectRef idx="0">
+            <a:schemeClr val="accent1"/>
+          </a:effectRef>
+          <a:fontRef idx="minor"/>
+        </p:style>
+        <p:txBody>
+          <a:bodyPr lIns="90000" tIns="90000" rIns="90000" bIns="90000" anchor="ctr">
+            <a:noAutofit/>
+          </a:bodyPr>
+          <a:lstStyle/>
+          <a:p>
+            <a:pPr algn="ctr">
+              <a:lnSpc>
+                <a:spcPct val="100000"/>
+              </a:lnSpc>
+            </a:pPr>
+            <a:r>
+              <a:rPr lang="fr-FR" sz="1400" b="1" strike="noStrike" spc="-1" dirty="0">
+                <a:latin typeface="Calibri"/>
+                <a:ea typeface="DejaVu Sans"/>
+              </a:rPr>
+              <a:t>CAR</a:t>
+            </a:r>
+            <a:endParaRPr lang="fr-FR" sz="1400" b="1" strike="noStrike" spc="-1" dirty="0">
+              <a:latin typeface="Arial"/>
+            </a:endParaRPr>
+          </a:p>
+        </p:txBody>
+      </p:sp>
+      <p:sp>
+        <p:nvSpPr>
+          <p:cNvPr id="67" name="CustomShape 25">
+            <a:extLst>
+              <a:ext uri="{FF2B5EF4-FFF2-40B4-BE49-F238E27FC236}">
+                <a16:creationId xmlns:a16="http://schemas.microsoft.com/office/drawing/2014/main" id="{CFF817C4-5319-3B7E-5390-49B3D01965BB}"/>
+              </a:ext>
+            </a:extLst>
+          </p:cNvPr>
+          <p:cNvSpPr/>
+          <p:nvPr/>
+        </p:nvSpPr>
+        <p:spPr>
+          <a:xfrm>
+            <a:off x="6662680" y="4991809"/>
+            <a:ext cx="673321" cy="304470"/>
+          </a:xfrm>
+          <a:prstGeom prst="roundRect">
+            <a:avLst>
+              <a:gd name="adj" fmla="val 16667"/>
+            </a:avLst>
+          </a:prstGeom>
+          <a:solidFill>
+            <a:srgbClr val="92D050"/>
+          </a:solidFill>
+          <a:ln>
+            <a:solidFill>
+              <a:schemeClr val="tx1"/>
+            </a:solidFill>
+          </a:ln>
+        </p:spPr>
+        <p:style>
+          <a:lnRef idx="2">
+            <a:schemeClr val="accent1">
+              <a:shade val="50000"/>
+            </a:schemeClr>
+          </a:lnRef>
+          <a:fillRef idx="1">
+            <a:schemeClr val="accent1"/>
+          </a:fillRef>
+          <a:effectRef idx="0">
+            <a:schemeClr val="accent1"/>
+          </a:effectRef>
+          <a:fontRef idx="minor"/>
+        </p:style>
+        <p:txBody>
+          <a:bodyPr lIns="90000" tIns="90000" rIns="90000" bIns="90000" anchor="ctr">
+            <a:noAutofit/>
+          </a:bodyPr>
+          <a:lstStyle/>
+          <a:p>
+            <a:pPr algn="ctr">
+              <a:lnSpc>
+                <a:spcPct val="100000"/>
+              </a:lnSpc>
+            </a:pPr>
+            <a:r>
+              <a:rPr lang="fr-FR" sz="1400" b="1" strike="noStrike" spc="-1" dirty="0">
+                <a:latin typeface="Calibri"/>
+                <a:ea typeface="DejaVu Sans"/>
+              </a:rPr>
+              <a:t>DEM</a:t>
+            </a:r>
+            <a:endParaRPr lang="fr-FR" sz="1400" b="1" strike="noStrike" spc="-1" dirty="0">
+              <a:latin typeface="Arial"/>
+            </a:endParaRPr>
+          </a:p>
+        </p:txBody>
+      </p:sp>
+      <p:cxnSp>
+        <p:nvCxnSpPr>
+          <p:cNvPr id="68" name="Connecteur droit avec flèche 67">
+            <a:extLst>
+              <a:ext uri="{FF2B5EF4-FFF2-40B4-BE49-F238E27FC236}">
+                <a16:creationId xmlns:a16="http://schemas.microsoft.com/office/drawing/2014/main" id="{77E397AC-35C2-F94B-6C4B-20E0C75624FC}"/>
+              </a:ext>
+            </a:extLst>
+          </p:cNvPr>
+          <p:cNvCxnSpPr>
+            <a:cxnSpLocks/>
+            <a:stCxn id="53" idx="6"/>
+            <a:endCxn id="100" idx="1"/>
+          </p:cNvCxnSpPr>
+          <p:nvPr/>
+        </p:nvCxnSpPr>
+        <p:spPr>
+          <a:xfrm flipV="1">
+            <a:off x="9346541" y="4771002"/>
+            <a:ext cx="636636" cy="804"/>
+          </a:xfrm>
+          <a:prstGeom prst="straightConnector1">
+            <a:avLst/>
+          </a:prstGeom>
+          <a:ln w="38100">
+            <a:solidFill>
+              <a:schemeClr val="tx1"/>
+            </a:solidFill>
+            <a:tailEnd type="triangle"/>
+          </a:ln>
+        </p:spPr>
+        <p:style>
+          <a:lnRef idx="1">
+            <a:schemeClr val="accent1"/>
+          </a:lnRef>
+          <a:fillRef idx="0">
+            <a:schemeClr val="accent1"/>
+          </a:fillRef>
+          <a:effectRef idx="0">
+            <a:schemeClr val="accent1"/>
+          </a:effectRef>
+          <a:fontRef idx="minor">
+            <a:schemeClr val="tx1"/>
+          </a:fontRef>
+        </p:style>
+      </p:cxnSp>
+      <p:sp>
+        <p:nvSpPr>
+          <p:cNvPr id="72" name="CustomShape 25">
+            <a:extLst>
+              <a:ext uri="{FF2B5EF4-FFF2-40B4-BE49-F238E27FC236}">
+                <a16:creationId xmlns:a16="http://schemas.microsoft.com/office/drawing/2014/main" id="{F93912B8-3EF1-9C63-9FEF-424B556C3CB7}"/>
+              </a:ext>
+            </a:extLst>
+          </p:cNvPr>
+          <p:cNvSpPr/>
+          <p:nvPr/>
+        </p:nvSpPr>
+        <p:spPr>
+          <a:xfrm>
+            <a:off x="4467360" y="4598608"/>
+            <a:ext cx="1122927" cy="346395"/>
+          </a:xfrm>
+          <a:prstGeom prst="roundRect">
+            <a:avLst>
+              <a:gd name="adj" fmla="val 16667"/>
+            </a:avLst>
+          </a:prstGeom>
+          <a:solidFill>
+            <a:srgbClr val="FFFF00"/>
+          </a:solidFill>
+          <a:ln>
+            <a:solidFill>
+              <a:schemeClr val="tx1"/>
+            </a:solidFill>
+          </a:ln>
+        </p:spPr>
+        <p:style>
+          <a:lnRef idx="2">
+            <a:schemeClr val="accent1">
+              <a:shade val="50000"/>
+            </a:schemeClr>
+          </a:lnRef>
+          <a:fillRef idx="1">
+            <a:schemeClr val="accent1"/>
+          </a:fillRef>
+          <a:effectRef idx="0">
+            <a:schemeClr val="accent1"/>
+          </a:effectRef>
+          <a:fontRef idx="minor"/>
+        </p:style>
+        <p:txBody>
+          <a:bodyPr lIns="90000" tIns="90000" rIns="90000" bIns="90000" anchor="ctr">
+            <a:noAutofit/>
+          </a:bodyPr>
+          <a:lstStyle/>
+          <a:p>
+            <a:pPr algn="ctr">
+              <a:lnSpc>
+                <a:spcPct val="100000"/>
+              </a:lnSpc>
+            </a:pPr>
+            <a:r>
+              <a:rPr lang="fr-FR" sz="1400" b="1" strike="noStrike" spc="-1" dirty="0">
+                <a:latin typeface="Calibri"/>
+                <a:ea typeface="DejaVu Sans"/>
+              </a:rPr>
+              <a:t>OUT_MOD</a:t>
+            </a:r>
+            <a:endParaRPr lang="fr-FR" sz="1400" b="1" strike="noStrike" spc="-1" dirty="0">
+              <a:latin typeface="Arial"/>
+            </a:endParaRPr>
+          </a:p>
+        </p:txBody>
+      </p:sp>
+      <p:cxnSp>
+        <p:nvCxnSpPr>
+          <p:cNvPr id="75" name="Connecteur droit avec flèche 74">
+            <a:extLst>
+              <a:ext uri="{FF2B5EF4-FFF2-40B4-BE49-F238E27FC236}">
+                <a16:creationId xmlns:a16="http://schemas.microsoft.com/office/drawing/2014/main" id="{E794561C-E56C-DB9A-A79A-42539BC5692A}"/>
+              </a:ext>
+            </a:extLst>
+          </p:cNvPr>
+          <p:cNvCxnSpPr>
+            <a:cxnSpLocks/>
+          </p:cNvCxnSpPr>
+          <p:nvPr/>
+        </p:nvCxnSpPr>
+        <p:spPr>
+          <a:xfrm>
+            <a:off x="1382655" y="2302219"/>
+            <a:ext cx="0" cy="1404657"/>
+          </a:xfrm>
+          <a:prstGeom prst="straightConnector1">
+            <a:avLst/>
+          </a:prstGeom>
+          <a:ln w="12700">
+            <a:solidFill>
+              <a:schemeClr val="tx1"/>
+            </a:solidFill>
+            <a:prstDash val="dashDot"/>
+            <a:headEnd type="none" w="med" len="med"/>
+            <a:tailEnd type="none" w="med" len="med"/>
+          </a:ln>
+        </p:spPr>
+        <p:style>
+          <a:lnRef idx="1">
+            <a:schemeClr val="accent1"/>
+          </a:lnRef>
+          <a:fillRef idx="0">
+            <a:schemeClr val="accent1"/>
+          </a:fillRef>
+          <a:effectRef idx="0">
+            <a:schemeClr val="accent1"/>
+          </a:effectRef>
+          <a:fontRef idx="minor">
+            <a:schemeClr val="tx1"/>
+          </a:fontRef>
+        </p:style>
+      </p:cxnSp>
+      <p:cxnSp>
+        <p:nvCxnSpPr>
+          <p:cNvPr id="77" name="Connecteur droit avec flèche 76">
+            <a:extLst>
+              <a:ext uri="{FF2B5EF4-FFF2-40B4-BE49-F238E27FC236}">
+                <a16:creationId xmlns:a16="http://schemas.microsoft.com/office/drawing/2014/main" id="{A68F703C-0E18-2D89-2215-C8DBA1619764}"/>
+              </a:ext>
+            </a:extLst>
+          </p:cNvPr>
+          <p:cNvCxnSpPr>
+            <a:cxnSpLocks/>
+          </p:cNvCxnSpPr>
+          <p:nvPr/>
+        </p:nvCxnSpPr>
+        <p:spPr>
+          <a:xfrm>
+            <a:off x="1382655" y="3706876"/>
+            <a:ext cx="3372225" cy="0"/>
+          </a:xfrm>
+          <a:prstGeom prst="straightConnector1">
+            <a:avLst/>
+          </a:prstGeom>
+          <a:ln w="12700">
+            <a:solidFill>
+              <a:schemeClr val="tx1"/>
+            </a:solidFill>
+            <a:prstDash val="dashDot"/>
+            <a:headEnd type="none" w="med" len="med"/>
+            <a:tailEnd type="none" w="med" len="med"/>
+          </a:ln>
+        </p:spPr>
+        <p:style>
+          <a:lnRef idx="1">
+            <a:schemeClr val="accent1"/>
+          </a:lnRef>
+          <a:fillRef idx="0">
+            <a:schemeClr val="accent1"/>
+          </a:fillRef>
+          <a:effectRef idx="0">
+            <a:schemeClr val="accent1"/>
+          </a:effectRef>
+          <a:fontRef idx="minor">
+            <a:schemeClr val="tx1"/>
+          </a:fontRef>
+        </p:style>
+      </p:cxnSp>
+      <p:cxnSp>
+        <p:nvCxnSpPr>
+          <p:cNvPr id="80" name="Connecteur droit avec flèche 79">
+            <a:extLst>
+              <a:ext uri="{FF2B5EF4-FFF2-40B4-BE49-F238E27FC236}">
+                <a16:creationId xmlns:a16="http://schemas.microsoft.com/office/drawing/2014/main" id="{042E398F-67B3-1B16-5229-48C20F019D3B}"/>
+              </a:ext>
+            </a:extLst>
+          </p:cNvPr>
+          <p:cNvCxnSpPr>
+            <a:cxnSpLocks/>
+          </p:cNvCxnSpPr>
+          <p:nvPr/>
+        </p:nvCxnSpPr>
+        <p:spPr>
+          <a:xfrm flipV="1">
+            <a:off x="4754880" y="3713601"/>
+            <a:ext cx="0" cy="841731"/>
+          </a:xfrm>
+          <a:prstGeom prst="straightConnector1">
+            <a:avLst/>
+          </a:prstGeom>
+          <a:ln w="12700">
+            <a:solidFill>
+              <a:schemeClr val="tx1"/>
+            </a:solidFill>
+            <a:prstDash val="dashDot"/>
+            <a:headEnd type="none" w="med" len="med"/>
+            <a:tailEnd type="none" w="med" len="med"/>
+          </a:ln>
+        </p:spPr>
+        <p:style>
+          <a:lnRef idx="1">
+            <a:schemeClr val="accent1"/>
+          </a:lnRef>
+          <a:fillRef idx="0">
+            <a:schemeClr val="accent1"/>
+          </a:fillRef>
+          <a:effectRef idx="0">
+            <a:schemeClr val="accent1"/>
+          </a:effectRef>
+          <a:fontRef idx="minor">
+            <a:schemeClr val="tx1"/>
+          </a:fontRef>
+        </p:style>
+      </p:cxnSp>
+      <p:cxnSp>
+        <p:nvCxnSpPr>
+          <p:cNvPr id="83" name="Connecteur droit avec flèche 82">
+            <a:extLst>
+              <a:ext uri="{FF2B5EF4-FFF2-40B4-BE49-F238E27FC236}">
+                <a16:creationId xmlns:a16="http://schemas.microsoft.com/office/drawing/2014/main" id="{766FBD21-4E08-05F9-35D6-7EBD5D6EB6E5}"/>
+              </a:ext>
+            </a:extLst>
+          </p:cNvPr>
+          <p:cNvCxnSpPr>
+            <a:cxnSpLocks/>
+          </p:cNvCxnSpPr>
+          <p:nvPr/>
+        </p:nvCxnSpPr>
+        <p:spPr>
+          <a:xfrm>
+            <a:off x="1382655" y="2253635"/>
+            <a:ext cx="303457" cy="0"/>
+          </a:xfrm>
+          <a:prstGeom prst="straightConnector1">
+            <a:avLst/>
+          </a:prstGeom>
+          <a:ln w="12700">
+            <a:solidFill>
+              <a:schemeClr val="tx1"/>
+            </a:solidFill>
+            <a:prstDash val="dashDot"/>
+            <a:headEnd type="none" w="med" len="med"/>
+            <a:tailEnd type="none" w="med" len="med"/>
+          </a:ln>
+        </p:spPr>
+        <p:style>
+          <a:lnRef idx="1">
+            <a:schemeClr val="accent1"/>
+          </a:lnRef>
+          <a:fillRef idx="0">
+            <a:schemeClr val="accent1"/>
+          </a:fillRef>
+          <a:effectRef idx="0">
+            <a:schemeClr val="accent1"/>
+          </a:effectRef>
+          <a:fontRef idx="minor">
+            <a:schemeClr val="tx1"/>
+          </a:fontRef>
+        </p:style>
+      </p:cxnSp>
+      <p:sp>
+        <p:nvSpPr>
+          <p:cNvPr id="85" name="Triangle isocèle 84">
+            <a:extLst>
+              <a:ext uri="{FF2B5EF4-FFF2-40B4-BE49-F238E27FC236}">
+                <a16:creationId xmlns:a16="http://schemas.microsoft.com/office/drawing/2014/main" id="{CF13A695-1C88-6407-5547-F9920532CA90}"/>
+              </a:ext>
+            </a:extLst>
+          </p:cNvPr>
+          <p:cNvSpPr/>
+          <p:nvPr/>
+        </p:nvSpPr>
+        <p:spPr>
+          <a:xfrm rot="5400000">
+            <a:off x="7712080" y="4896988"/>
+            <a:ext cx="480697" cy="494112"/>
+          </a:xfrm>
+          <a:prstGeom prst="triangle">
+            <a:avLst/>
+          </a:prstGeom>
+        </p:spPr>
+        <p:style>
+          <a:lnRef idx="2">
+            <a:schemeClr val="accent1">
+              <a:shade val="15000"/>
+            </a:schemeClr>
+          </a:lnRef>
+          <a:fillRef idx="1">
+            <a:schemeClr val="accent1"/>
+          </a:fillRef>
+          <a:effectRef idx="0">
+            <a:schemeClr val="accent1"/>
+          </a:effectRef>
+          <a:fontRef idx="minor">
+            <a:schemeClr val="lt1"/>
+          </a:fontRef>
+        </p:style>
+        <p:txBody>
+          <a:bodyPr rtlCol="0" anchor="ctr"/>
+          <a:lstStyle/>
+          <a:p>
+            <a:pPr algn="ctr"/>
+            <a:endParaRPr lang="fr-FR" dirty="0"/>
+          </a:p>
+        </p:txBody>
+      </p:sp>
+      <p:sp>
+        <p:nvSpPr>
+          <p:cNvPr id="86" name="ZoneTexte 85">
+            <a:extLst>
+              <a:ext uri="{FF2B5EF4-FFF2-40B4-BE49-F238E27FC236}">
+                <a16:creationId xmlns:a16="http://schemas.microsoft.com/office/drawing/2014/main" id="{382071EA-63A8-BF71-90A8-64CBCF210CB8}"/>
+              </a:ext>
+            </a:extLst>
+          </p:cNvPr>
+          <p:cNvSpPr txBox="1"/>
+          <p:nvPr/>
+        </p:nvSpPr>
+        <p:spPr>
+          <a:xfrm>
+            <a:off x="7705371" y="4964455"/>
+            <a:ext cx="464058" cy="338554"/>
+          </a:xfrm>
+          <a:prstGeom prst="rect">
+            <a:avLst/>
+          </a:prstGeom>
+          <a:noFill/>
+        </p:spPr>
+        <p:txBody>
+          <a:bodyPr wrap="square">
+            <a:spAutoFit/>
+          </a:bodyPr>
+          <a:lstStyle/>
+          <a:p>
+            <a:r>
+              <a:rPr lang="fr-FR" sz="1600" b="0" strike="noStrike" spc="-1" dirty="0">
+                <a:solidFill>
+                  <a:schemeClr val="bg1"/>
+                </a:solidFill>
+                <a:latin typeface="Calibri"/>
+                <a:ea typeface="DejaVu Sans"/>
+              </a:rPr>
+              <a:t>G</a:t>
+            </a:r>
+            <a:endParaRPr lang="fr-FR" sz="1600" dirty="0">
+              <a:solidFill>
+                <a:schemeClr val="bg1"/>
+              </a:solidFill>
+            </a:endParaRPr>
+          </a:p>
+        </p:txBody>
+      </p:sp>
+      <p:cxnSp>
+        <p:nvCxnSpPr>
+          <p:cNvPr id="93" name="Connecteur droit avec flèche 92">
+            <a:extLst>
+              <a:ext uri="{FF2B5EF4-FFF2-40B4-BE49-F238E27FC236}">
+                <a16:creationId xmlns:a16="http://schemas.microsoft.com/office/drawing/2014/main" id="{333EA6B7-BDD5-998C-78A3-9A8E75448EF6}"/>
+              </a:ext>
+            </a:extLst>
+          </p:cNvPr>
+          <p:cNvCxnSpPr>
+            <a:cxnSpLocks/>
+            <a:stCxn id="85" idx="0"/>
+          </p:cNvCxnSpPr>
+          <p:nvPr/>
+        </p:nvCxnSpPr>
+        <p:spPr>
+          <a:xfrm flipV="1">
+            <a:off x="8199485" y="5144044"/>
+            <a:ext cx="224502" cy="1"/>
+          </a:xfrm>
+          <a:prstGeom prst="straightConnector1">
+            <a:avLst/>
+          </a:prstGeom>
+          <a:ln w="38100">
+            <a:solidFill>
+              <a:schemeClr val="tx1"/>
+            </a:solidFill>
+            <a:headEnd type="none" w="med" len="med"/>
+            <a:tailEnd type="none" w="med" len="med"/>
+          </a:ln>
+        </p:spPr>
+        <p:style>
+          <a:lnRef idx="1">
+            <a:schemeClr val="accent1"/>
+          </a:lnRef>
+          <a:fillRef idx="0">
+            <a:schemeClr val="accent1"/>
+          </a:fillRef>
+          <a:effectRef idx="0">
+            <a:schemeClr val="accent1"/>
+          </a:effectRef>
+          <a:fontRef idx="minor">
+            <a:schemeClr val="tx1"/>
+          </a:fontRef>
+        </p:style>
+      </p:cxnSp>
+      <p:sp>
+        <p:nvSpPr>
+          <p:cNvPr id="100" name="CustomShape 25">
+            <a:extLst>
+              <a:ext uri="{FF2B5EF4-FFF2-40B4-BE49-F238E27FC236}">
+                <a16:creationId xmlns:a16="http://schemas.microsoft.com/office/drawing/2014/main" id="{88D6A93F-AABF-0A47-DF59-1F9701C3872B}"/>
+              </a:ext>
+            </a:extLst>
+          </p:cNvPr>
+          <p:cNvSpPr/>
+          <p:nvPr/>
+        </p:nvSpPr>
+        <p:spPr>
+          <a:xfrm>
+            <a:off x="9983177" y="4566048"/>
+            <a:ext cx="1118212" cy="409907"/>
+          </a:xfrm>
+          <a:prstGeom prst="roundRect">
+            <a:avLst>
+              <a:gd name="adj" fmla="val 16667"/>
+            </a:avLst>
+          </a:prstGeom>
+          <a:solidFill>
+            <a:srgbClr val="FFFFFF"/>
+          </a:solidFill>
+          <a:ln>
+            <a:solidFill>
+              <a:schemeClr val="tx1"/>
+            </a:solidFill>
+          </a:ln>
+        </p:spPr>
+        <p:style>
+          <a:lnRef idx="2">
+            <a:schemeClr val="accent1">
+              <a:shade val="50000"/>
+            </a:schemeClr>
+          </a:lnRef>
+          <a:fillRef idx="1">
+            <a:schemeClr val="accent1"/>
+          </a:fillRef>
+          <a:effectRef idx="0">
+            <a:schemeClr val="accent1"/>
+          </a:effectRef>
+          <a:fontRef idx="minor"/>
+        </p:style>
+        <p:txBody>
+          <a:bodyPr lIns="90000" tIns="90000" rIns="90000" bIns="90000" anchor="ctr">
+            <a:noAutofit/>
+          </a:bodyPr>
+          <a:lstStyle/>
+          <a:p>
+            <a:pPr algn="ctr">
+              <a:lnSpc>
+                <a:spcPct val="100000"/>
+              </a:lnSpc>
+            </a:pPr>
+            <a:r>
+              <a:rPr lang="fr-FR" sz="1600" b="1" spc="-1" dirty="0">
+                <a:latin typeface="Calibri"/>
+                <a:ea typeface="DejaVu Sans"/>
+              </a:rPr>
+              <a:t>OUT_DEM</a:t>
+            </a:r>
+            <a:endParaRPr lang="fr-FR" sz="1600" b="1" strike="noStrike" spc="-1" dirty="0">
+              <a:latin typeface="Arial"/>
+            </a:endParaRPr>
+          </a:p>
+        </p:txBody>
+      </p:sp>
+      <p:cxnSp>
+        <p:nvCxnSpPr>
+          <p:cNvPr id="103" name="Connecteur droit avec flèche 102">
+            <a:extLst>
+              <a:ext uri="{FF2B5EF4-FFF2-40B4-BE49-F238E27FC236}">
+                <a16:creationId xmlns:a16="http://schemas.microsoft.com/office/drawing/2014/main" id="{5CE97CE3-533B-3BCF-922D-3D501A382B91}"/>
+              </a:ext>
+            </a:extLst>
+          </p:cNvPr>
+          <p:cNvCxnSpPr>
+            <a:cxnSpLocks/>
+            <a:stCxn id="67" idx="0"/>
+          </p:cNvCxnSpPr>
+          <p:nvPr/>
+        </p:nvCxnSpPr>
+        <p:spPr>
+          <a:xfrm flipV="1">
+            <a:off x="6999341" y="3736907"/>
+            <a:ext cx="0" cy="1254902"/>
+          </a:xfrm>
+          <a:prstGeom prst="straightConnector1">
+            <a:avLst/>
+          </a:prstGeom>
+          <a:ln w="12700">
+            <a:solidFill>
+              <a:schemeClr val="tx1"/>
+            </a:solidFill>
+            <a:prstDash val="dashDot"/>
+            <a:headEnd type="none" w="med" len="med"/>
+            <a:tailEnd type="none" w="med" len="med"/>
+          </a:ln>
+        </p:spPr>
+        <p:style>
+          <a:lnRef idx="1">
+            <a:schemeClr val="accent1"/>
+          </a:lnRef>
+          <a:fillRef idx="0">
+            <a:schemeClr val="accent1"/>
+          </a:fillRef>
+          <a:effectRef idx="0">
+            <a:schemeClr val="accent1"/>
+          </a:effectRef>
+          <a:fontRef idx="minor">
+            <a:schemeClr val="tx1"/>
+          </a:fontRef>
+        </p:style>
+      </p:cxnSp>
+      <p:cxnSp>
+        <p:nvCxnSpPr>
+          <p:cNvPr id="105" name="Connecteur droit avec flèche 104">
+            <a:extLst>
+              <a:ext uri="{FF2B5EF4-FFF2-40B4-BE49-F238E27FC236}">
+                <a16:creationId xmlns:a16="http://schemas.microsoft.com/office/drawing/2014/main" id="{56FD6499-ABDF-6B34-853C-5F44CEF1BE42}"/>
+              </a:ext>
+            </a:extLst>
+          </p:cNvPr>
+          <p:cNvCxnSpPr>
+            <a:cxnSpLocks/>
+          </p:cNvCxnSpPr>
+          <p:nvPr/>
+        </p:nvCxnSpPr>
+        <p:spPr>
+          <a:xfrm>
+            <a:off x="6999340" y="3720710"/>
+            <a:ext cx="3984616" cy="0"/>
+          </a:xfrm>
+          <a:prstGeom prst="straightConnector1">
+            <a:avLst/>
+          </a:prstGeom>
+          <a:ln w="12700">
+            <a:solidFill>
+              <a:schemeClr val="tx1"/>
+            </a:solidFill>
+            <a:prstDash val="dashDot"/>
+            <a:headEnd type="none" w="med" len="med"/>
+            <a:tailEnd type="none" w="med" len="med"/>
+          </a:ln>
+        </p:spPr>
+        <p:style>
+          <a:lnRef idx="1">
+            <a:schemeClr val="accent1"/>
+          </a:lnRef>
+          <a:fillRef idx="0">
+            <a:schemeClr val="accent1"/>
+          </a:fillRef>
+          <a:effectRef idx="0">
+            <a:schemeClr val="accent1"/>
+          </a:effectRef>
+          <a:fontRef idx="minor">
+            <a:schemeClr val="tx1"/>
+          </a:fontRef>
+        </p:style>
+      </p:cxnSp>
+      <p:cxnSp>
+        <p:nvCxnSpPr>
+          <p:cNvPr id="112" name="Connecteur droit avec flèche 111">
+            <a:extLst>
+              <a:ext uri="{FF2B5EF4-FFF2-40B4-BE49-F238E27FC236}">
+                <a16:creationId xmlns:a16="http://schemas.microsoft.com/office/drawing/2014/main" id="{3B22C767-4104-75D6-5896-0F5BE8FB8B11}"/>
+              </a:ext>
+            </a:extLst>
+          </p:cNvPr>
+          <p:cNvCxnSpPr>
+            <a:cxnSpLocks/>
+          </p:cNvCxnSpPr>
+          <p:nvPr/>
+        </p:nvCxnSpPr>
+        <p:spPr>
+          <a:xfrm>
+            <a:off x="10971256" y="2480019"/>
+            <a:ext cx="0" cy="1226857"/>
+          </a:xfrm>
+          <a:prstGeom prst="straightConnector1">
+            <a:avLst/>
+          </a:prstGeom>
+          <a:ln w="12700">
+            <a:solidFill>
+              <a:schemeClr val="tx1"/>
+            </a:solidFill>
+            <a:prstDash val="dashDot"/>
+            <a:headEnd type="none" w="med" len="med"/>
+            <a:tailEnd type="none" w="med" len="med"/>
+          </a:ln>
+        </p:spPr>
+        <p:style>
+          <a:lnRef idx="1">
+            <a:schemeClr val="accent1"/>
+          </a:lnRef>
+          <a:fillRef idx="0">
+            <a:schemeClr val="accent1"/>
+          </a:fillRef>
+          <a:effectRef idx="0">
+            <a:schemeClr val="accent1"/>
+          </a:effectRef>
+          <a:fontRef idx="minor">
+            <a:schemeClr val="tx1"/>
+          </a:fontRef>
+        </p:style>
+      </p:cxnSp>
     </p:spTree>
     <p:extLst>
       <p:ext uri="{BB962C8B-B14F-4D97-AF65-F5344CB8AC3E}">

</xml_diff>